<commit_message>
update the raspberry PI RTU reading code.
</commit_message>
<xml_diff>
--- a/doc/designDoc.pptx
+++ b/doc/designDoc.pptx
@@ -5,8 +5,10 @@
     <p:sldMasterId id="2147483648" r:id="rId1"/>
   </p:sldMasterIdLst>
   <p:sldIdLst>
-    <p:sldId id="256" r:id="rId2"/>
-    <p:sldId id="257" r:id="rId3"/>
+    <p:sldId id="259" r:id="rId2"/>
+    <p:sldId id="256" r:id="rId3"/>
+    <p:sldId id="257" r:id="rId4"/>
+    <p:sldId id="258" r:id="rId5"/>
   </p:sldIdLst>
   <p:sldSz cx="12192000" cy="6858000"/>
   <p:notesSz cx="6858000" cy="9144000"/>
@@ -105,6 +107,11 @@
       </a:defRPr>
     </a:lvl9pPr>
   </p:defaultTextStyle>
+  <p:extLst>
+    <p:ext uri="{EFAFB233-063F-42B5-8137-9DF3F51BA10A}">
+      <p15:sldGuideLst xmlns:p15="http://schemas.microsoft.com/office/powerpoint/2012/main"/>
+    </p:ext>
+  </p:extLst>
 </p:presentation>
 </file>
 
@@ -3327,6 +3334,349 @@
 </file>
 
 <file path=ppt/slides/slide1.xml><?xml version="1.0" encoding="utf-8"?>
+<p:sld xmlns:a="http://schemas.openxmlformats.org/drawingml/2006/main" xmlns:r="http://schemas.openxmlformats.org/officeDocument/2006/relationships" xmlns:p="http://schemas.openxmlformats.org/presentationml/2006/main">
+  <p:cSld>
+    <p:spTree>
+      <p:nvGrpSpPr>
+        <p:cNvPr id="1" name=""/>
+        <p:cNvGrpSpPr/>
+        <p:nvPr/>
+      </p:nvGrpSpPr>
+      <p:grpSpPr>
+        <a:xfrm>
+          <a:off x="0" y="0"/>
+          <a:ext cx="0" cy="0"/>
+          <a:chOff x="0" y="0"/>
+          <a:chExt cx="0" cy="0"/>
+        </a:xfrm>
+      </p:grpSpPr>
+      <p:pic>
+        <p:nvPicPr>
+          <p:cNvPr id="12" name="Picture 11">
+            <a:extLst>
+              <a:ext uri="{FF2B5EF4-FFF2-40B4-BE49-F238E27FC236}">
+                <a16:creationId xmlns:a16="http://schemas.microsoft.com/office/drawing/2014/main" id="{9B655269-7109-556D-71FD-899A99DA7648}"/>
+              </a:ext>
+            </a:extLst>
+          </p:cNvPr>
+          <p:cNvPicPr>
+            <a:picLocks noChangeAspect="1"/>
+          </p:cNvPicPr>
+          <p:nvPr/>
+        </p:nvPicPr>
+        <p:blipFill>
+          <a:blip r:embed="rId2"/>
+          <a:stretch>
+            <a:fillRect/>
+          </a:stretch>
+        </p:blipFill>
+        <p:spPr>
+          <a:xfrm>
+            <a:off x="7525545" y="2225028"/>
+            <a:ext cx="2008018" cy="2072603"/>
+          </a:xfrm>
+          <a:prstGeom prst="rect">
+            <a:avLst/>
+          </a:prstGeom>
+        </p:spPr>
+      </p:pic>
+      <p:pic>
+        <p:nvPicPr>
+          <p:cNvPr id="5" name="Picture 4" descr="A diagram of a circuit&#10;&#10;Description automatically generated">
+            <a:extLst>
+              <a:ext uri="{FF2B5EF4-FFF2-40B4-BE49-F238E27FC236}">
+                <a16:creationId xmlns:a16="http://schemas.microsoft.com/office/drawing/2014/main" id="{23BE33B7-D9E9-2B88-2D98-C1C448AAED20}"/>
+              </a:ext>
+            </a:extLst>
+          </p:cNvPr>
+          <p:cNvPicPr>
+            <a:picLocks noChangeAspect="1"/>
+          </p:cNvPicPr>
+          <p:nvPr/>
+        </p:nvPicPr>
+        <p:blipFill>
+          <a:blip r:embed="rId3">
+            <a:extLst>
+              <a:ext uri="{28A0092B-C50C-407E-A947-70E740481C1C}">
+                <a14:useLocalDpi xmlns:a14="http://schemas.microsoft.com/office/drawing/2010/main" val="0"/>
+              </a:ext>
+            </a:extLst>
+          </a:blip>
+          <a:stretch>
+            <a:fillRect/>
+          </a:stretch>
+        </p:blipFill>
+        <p:spPr>
+          <a:xfrm>
+            <a:off x="1252330" y="1142293"/>
+            <a:ext cx="5828571" cy="3933333"/>
+          </a:xfrm>
+          <a:prstGeom prst="rect">
+            <a:avLst/>
+          </a:prstGeom>
+        </p:spPr>
+      </p:pic>
+      <p:cxnSp>
+        <p:nvCxnSpPr>
+          <p:cNvPr id="11" name="Straight Arrow Connector 10">
+            <a:extLst>
+              <a:ext uri="{FF2B5EF4-FFF2-40B4-BE49-F238E27FC236}">
+                <a16:creationId xmlns:a16="http://schemas.microsoft.com/office/drawing/2014/main" id="{ACE6B75C-388B-C928-DB66-647E1368EF33}"/>
+              </a:ext>
+            </a:extLst>
+          </p:cNvPr>
+          <p:cNvCxnSpPr>
+            <a:cxnSpLocks/>
+          </p:cNvCxnSpPr>
+          <p:nvPr/>
+        </p:nvCxnSpPr>
+        <p:spPr>
+          <a:xfrm flipV="1">
+            <a:off x="8138160" y="4201668"/>
+            <a:ext cx="0" cy="785213"/>
+          </a:xfrm>
+          <a:prstGeom prst="straightConnector1">
+            <a:avLst/>
+          </a:prstGeom>
+          <a:ln>
+            <a:solidFill>
+              <a:srgbClr val="C00000"/>
+            </a:solidFill>
+            <a:tailEnd type="triangle"/>
+          </a:ln>
+        </p:spPr>
+        <p:style>
+          <a:lnRef idx="2">
+            <a:schemeClr val="accent1"/>
+          </a:lnRef>
+          <a:fillRef idx="0">
+            <a:schemeClr val="accent1"/>
+          </a:fillRef>
+          <a:effectRef idx="1">
+            <a:schemeClr val="accent1"/>
+          </a:effectRef>
+          <a:fontRef idx="minor">
+            <a:schemeClr val="tx1"/>
+          </a:fontRef>
+        </p:style>
+      </p:cxnSp>
+      <p:cxnSp>
+        <p:nvCxnSpPr>
+          <p:cNvPr id="14" name="Straight Connector 13">
+            <a:extLst>
+              <a:ext uri="{FF2B5EF4-FFF2-40B4-BE49-F238E27FC236}">
+                <a16:creationId xmlns:a16="http://schemas.microsoft.com/office/drawing/2014/main" id="{18368F5B-5DBE-4410-9C50-E67691C99DEE}"/>
+              </a:ext>
+            </a:extLst>
+          </p:cNvPr>
+          <p:cNvCxnSpPr/>
+          <p:nvPr/>
+        </p:nvCxnSpPr>
+        <p:spPr>
+          <a:xfrm>
+            <a:off x="2807208" y="3429000"/>
+            <a:ext cx="0" cy="1545336"/>
+          </a:xfrm>
+          <a:prstGeom prst="line">
+            <a:avLst/>
+          </a:prstGeom>
+          <a:ln>
+            <a:solidFill>
+              <a:srgbClr val="C00000"/>
+            </a:solidFill>
+          </a:ln>
+        </p:spPr>
+        <p:style>
+          <a:lnRef idx="2">
+            <a:schemeClr val="accent1"/>
+          </a:lnRef>
+          <a:fillRef idx="0">
+            <a:schemeClr val="accent1"/>
+          </a:fillRef>
+          <a:effectRef idx="1">
+            <a:schemeClr val="accent1"/>
+          </a:effectRef>
+          <a:fontRef idx="minor">
+            <a:schemeClr val="tx1"/>
+          </a:fontRef>
+        </p:style>
+      </p:cxnSp>
+      <p:cxnSp>
+        <p:nvCxnSpPr>
+          <p:cNvPr id="15" name="Straight Connector 14">
+            <a:extLst>
+              <a:ext uri="{FF2B5EF4-FFF2-40B4-BE49-F238E27FC236}">
+                <a16:creationId xmlns:a16="http://schemas.microsoft.com/office/drawing/2014/main" id="{3812618D-174B-C337-E927-7A0388D7CBC2}"/>
+              </a:ext>
+            </a:extLst>
+          </p:cNvPr>
+          <p:cNvCxnSpPr>
+            <a:cxnSpLocks/>
+          </p:cNvCxnSpPr>
+          <p:nvPr/>
+        </p:nvCxnSpPr>
+        <p:spPr>
+          <a:xfrm flipH="1">
+            <a:off x="2807208" y="4961791"/>
+            <a:ext cx="6156959" cy="25090"/>
+          </a:xfrm>
+          <a:prstGeom prst="line">
+            <a:avLst/>
+          </a:prstGeom>
+          <a:ln>
+            <a:solidFill>
+              <a:srgbClr val="C00000"/>
+            </a:solidFill>
+          </a:ln>
+        </p:spPr>
+        <p:style>
+          <a:lnRef idx="2">
+            <a:schemeClr val="accent1"/>
+          </a:lnRef>
+          <a:fillRef idx="0">
+            <a:schemeClr val="accent1"/>
+          </a:fillRef>
+          <a:effectRef idx="1">
+            <a:schemeClr val="accent1"/>
+          </a:effectRef>
+          <a:fontRef idx="minor">
+            <a:schemeClr val="tx1"/>
+          </a:fontRef>
+        </p:style>
+      </p:cxnSp>
+      <p:cxnSp>
+        <p:nvCxnSpPr>
+          <p:cNvPr id="20" name="Straight Arrow Connector 19">
+            <a:extLst>
+              <a:ext uri="{FF2B5EF4-FFF2-40B4-BE49-F238E27FC236}">
+                <a16:creationId xmlns:a16="http://schemas.microsoft.com/office/drawing/2014/main" id="{F8F40127-515D-2E3D-1748-DA4CF70B5F99}"/>
+              </a:ext>
+            </a:extLst>
+          </p:cNvPr>
+          <p:cNvCxnSpPr>
+            <a:cxnSpLocks/>
+          </p:cNvCxnSpPr>
+          <p:nvPr/>
+        </p:nvCxnSpPr>
+        <p:spPr>
+          <a:xfrm flipV="1">
+            <a:off x="8951975" y="4201668"/>
+            <a:ext cx="0" cy="785213"/>
+          </a:xfrm>
+          <a:prstGeom prst="straightConnector1">
+            <a:avLst/>
+          </a:prstGeom>
+          <a:ln>
+            <a:solidFill>
+              <a:srgbClr val="C00000"/>
+            </a:solidFill>
+            <a:tailEnd type="triangle"/>
+          </a:ln>
+        </p:spPr>
+        <p:style>
+          <a:lnRef idx="2">
+            <a:schemeClr val="accent1"/>
+          </a:lnRef>
+          <a:fillRef idx="0">
+            <a:schemeClr val="accent1"/>
+          </a:fillRef>
+          <a:effectRef idx="1">
+            <a:schemeClr val="accent1"/>
+          </a:effectRef>
+          <a:fontRef idx="minor">
+            <a:schemeClr val="tx1"/>
+          </a:fontRef>
+        </p:style>
+      </p:cxnSp>
+      <p:sp>
+        <p:nvSpPr>
+          <p:cNvPr id="21" name="TextBox 20">
+            <a:extLst>
+              <a:ext uri="{FF2B5EF4-FFF2-40B4-BE49-F238E27FC236}">
+                <a16:creationId xmlns:a16="http://schemas.microsoft.com/office/drawing/2014/main" id="{E6A4F610-6D42-F3C7-576D-723903DBD494}"/>
+              </a:ext>
+            </a:extLst>
+          </p:cNvPr>
+          <p:cNvSpPr txBox="1"/>
+          <p:nvPr/>
+        </p:nvSpPr>
+        <p:spPr>
+          <a:xfrm>
+            <a:off x="2807208" y="5098070"/>
+            <a:ext cx="6620256" cy="276999"/>
+          </a:xfrm>
+          <a:prstGeom prst="rect">
+            <a:avLst/>
+          </a:prstGeom>
+          <a:noFill/>
+        </p:spPr>
+        <p:txBody>
+          <a:bodyPr wrap="square" rtlCol="0">
+            <a:spAutoFit/>
+          </a:bodyPr>
+          <a:lstStyle/>
+          <a:p>
+            <a:r>
+              <a:rPr lang="en-SG" sz="1200" b="1" dirty="0">
+                <a:solidFill>
+                  <a:srgbClr val="C00000"/>
+                </a:solidFill>
+              </a:rPr>
+              <a:t>Remove the signal volage VCC pullup resistor to reduce the max signal volage to 3.3 V</a:t>
+            </a:r>
+          </a:p>
+        </p:txBody>
+      </p:sp>
+      <p:sp>
+        <p:nvSpPr>
+          <p:cNvPr id="22" name="TextBox 21">
+            <a:extLst>
+              <a:ext uri="{FF2B5EF4-FFF2-40B4-BE49-F238E27FC236}">
+                <a16:creationId xmlns:a16="http://schemas.microsoft.com/office/drawing/2014/main" id="{0C657385-6B7B-B577-324B-6A22DB9F79A4}"/>
+              </a:ext>
+            </a:extLst>
+          </p:cNvPr>
+          <p:cNvSpPr txBox="1"/>
+          <p:nvPr/>
+        </p:nvSpPr>
+        <p:spPr>
+          <a:xfrm>
+            <a:off x="7419446" y="1830880"/>
+            <a:ext cx="2008018" cy="338554"/>
+          </a:xfrm>
+          <a:prstGeom prst="rect">
+            <a:avLst/>
+          </a:prstGeom>
+          <a:noFill/>
+        </p:spPr>
+        <p:txBody>
+          <a:bodyPr wrap="square" rtlCol="0">
+            <a:spAutoFit/>
+          </a:bodyPr>
+          <a:lstStyle/>
+          <a:p>
+            <a:r>
+              <a:rPr lang="en-US" sz="1600" b="1"/>
+              <a:t>I2C DS1307 RTC</a:t>
+            </a:r>
+            <a:endParaRPr lang="en-SG" sz="1600" b="1" dirty="0"/>
+          </a:p>
+        </p:txBody>
+      </p:sp>
+    </p:spTree>
+    <p:extLst>
+      <p:ext uri="{BB962C8B-B14F-4D97-AF65-F5344CB8AC3E}">
+        <p14:creationId xmlns:p14="http://schemas.microsoft.com/office/powerpoint/2010/main" val="960785949"/>
+      </p:ext>
+    </p:extLst>
+  </p:cSld>
+  <p:clrMapOvr>
+    <a:masterClrMapping/>
+  </p:clrMapOvr>
+</p:sld>
+</file>
+
+<file path=ppt/slides/slide2.xml><?xml version="1.0" encoding="utf-8"?>
 <p:sld xmlns:a="http://schemas.openxmlformats.org/drawingml/2006/main" xmlns:r="http://schemas.openxmlformats.org/officeDocument/2006/relationships" xmlns:p="http://schemas.openxmlformats.org/presentationml/2006/main">
   <p:cSld>
     <p:spTree>
@@ -4205,7 +4555,7 @@
 </p:sld>
 </file>
 
-<file path=ppt/slides/slide2.xml><?xml version="1.0" encoding="utf-8"?>
+<file path=ppt/slides/slide3.xml><?xml version="1.0" encoding="utf-8"?>
 <p:sld xmlns:a="http://schemas.openxmlformats.org/drawingml/2006/main" xmlns:r="http://schemas.openxmlformats.org/officeDocument/2006/relationships" xmlns:p="http://schemas.openxmlformats.org/presentationml/2006/main">
   <p:cSld>
     <p:spTree>
@@ -4460,7 +4810,7 @@
           <p:nvPr>
             <p:extLst>
               <p:ext uri="{D42A27DB-BD31-4B8C-83A1-F6EECF244321}">
-                <p14:modId xmlns:p14="http://schemas.microsoft.com/office/powerpoint/2010/main" val="3874633643"/>
+                <p14:modId xmlns:p14="http://schemas.microsoft.com/office/powerpoint/2010/main" val="999337465"/>
               </p:ext>
             </p:extLst>
           </p:nvPr>
@@ -4684,12 +5034,8 @@
                     <a:lstStyle/>
                     <a:p>
                       <a:r>
-                        <a:rPr lang="en-US" sz="1100" b="1"/>
-                        <a:t>Pin25 A4</a:t>
-                      </a:r>
-                      <a:r>
                         <a:rPr lang="en-US" sz="1100" b="1" dirty="0"/>
-                        <a:t>/D18 SDA</a:t>
+                        <a:t>Pin25 A4/D18 SDA</a:t>
                       </a:r>
                       <a:endParaRPr lang="en-SG" sz="1100" b="1" dirty="0"/>
                     </a:p>
@@ -5012,6 +5358,1035 @@
     <p:extLst>
       <p:ext uri="{BB962C8B-B14F-4D97-AF65-F5344CB8AC3E}">
         <p14:creationId xmlns:p14="http://schemas.microsoft.com/office/powerpoint/2010/main" val="3420719083"/>
+      </p:ext>
+    </p:extLst>
+  </p:cSld>
+  <p:clrMapOvr>
+    <a:masterClrMapping/>
+  </p:clrMapOvr>
+</p:sld>
+</file>
+
+<file path=ppt/slides/slide4.xml><?xml version="1.0" encoding="utf-8"?>
+<p:sld xmlns:a="http://schemas.openxmlformats.org/drawingml/2006/main" xmlns:r="http://schemas.openxmlformats.org/officeDocument/2006/relationships" xmlns:p="http://schemas.openxmlformats.org/presentationml/2006/main">
+  <p:cSld>
+    <p:spTree>
+      <p:nvGrpSpPr>
+        <p:cNvPr id="1" name=""/>
+        <p:cNvGrpSpPr/>
+        <p:nvPr/>
+      </p:nvGrpSpPr>
+      <p:grpSpPr>
+        <a:xfrm>
+          <a:off x="0" y="0"/>
+          <a:ext cx="0" cy="0"/>
+          <a:chOff x="0" y="0"/>
+          <a:chExt cx="0" cy="0"/>
+        </a:xfrm>
+      </p:grpSpPr>
+      <p:pic>
+        <p:nvPicPr>
+          <p:cNvPr id="5" name="Picture 4" descr="A diagram of a circuit board&#10;&#10;Description automatically generated">
+            <a:extLst>
+              <a:ext uri="{FF2B5EF4-FFF2-40B4-BE49-F238E27FC236}">
+                <a16:creationId xmlns:a16="http://schemas.microsoft.com/office/drawing/2014/main" id="{0804EC2E-2FCD-A6A1-2335-AD1E4EB2B5A5}"/>
+              </a:ext>
+            </a:extLst>
+          </p:cNvPr>
+          <p:cNvPicPr>
+            <a:picLocks noChangeAspect="1"/>
+          </p:cNvPicPr>
+          <p:nvPr/>
+        </p:nvPicPr>
+        <p:blipFill>
+          <a:blip r:embed="rId2">
+            <a:extLst>
+              <a:ext uri="{28A0092B-C50C-407E-A947-70E740481C1C}">
+                <a14:useLocalDpi xmlns:a14="http://schemas.microsoft.com/office/drawing/2010/main" val="0"/>
+              </a:ext>
+            </a:extLst>
+          </a:blip>
+          <a:stretch>
+            <a:fillRect/>
+          </a:stretch>
+        </p:blipFill>
+        <p:spPr>
+          <a:xfrm>
+            <a:off x="282085" y="1250302"/>
+            <a:ext cx="7345814" cy="4217437"/>
+          </a:xfrm>
+          <a:prstGeom prst="rect">
+            <a:avLst/>
+          </a:prstGeom>
+        </p:spPr>
+      </p:pic>
+      <p:pic>
+        <p:nvPicPr>
+          <p:cNvPr id="6" name="Picture 5">
+            <a:extLst>
+              <a:ext uri="{FF2B5EF4-FFF2-40B4-BE49-F238E27FC236}">
+                <a16:creationId xmlns:a16="http://schemas.microsoft.com/office/drawing/2014/main" id="{3EEC0EEE-4762-FBE8-FF9A-6F4BB131865E}"/>
+              </a:ext>
+            </a:extLst>
+          </p:cNvPr>
+          <p:cNvPicPr>
+            <a:picLocks noChangeAspect="1"/>
+          </p:cNvPicPr>
+          <p:nvPr/>
+        </p:nvPicPr>
+        <p:blipFill>
+          <a:blip r:embed="rId3"/>
+          <a:stretch>
+            <a:fillRect/>
+          </a:stretch>
+        </p:blipFill>
+        <p:spPr>
+          <a:xfrm>
+            <a:off x="8109477" y="1640136"/>
+            <a:ext cx="2008018" cy="2072603"/>
+          </a:xfrm>
+          <a:prstGeom prst="rect">
+            <a:avLst/>
+          </a:prstGeom>
+        </p:spPr>
+      </p:pic>
+      <p:cxnSp>
+        <p:nvCxnSpPr>
+          <p:cNvPr id="7" name="Connector: Elbow 6">
+            <a:extLst>
+              <a:ext uri="{FF2B5EF4-FFF2-40B4-BE49-F238E27FC236}">
+                <a16:creationId xmlns:a16="http://schemas.microsoft.com/office/drawing/2014/main" id="{08BEF2B4-14A1-361D-C924-09C75768EA0D}"/>
+              </a:ext>
+            </a:extLst>
+          </p:cNvPr>
+          <p:cNvCxnSpPr>
+            <a:cxnSpLocks/>
+          </p:cNvCxnSpPr>
+          <p:nvPr/>
+        </p:nvCxnSpPr>
+        <p:spPr>
+          <a:xfrm>
+            <a:off x="6317357" y="2189021"/>
+            <a:ext cx="1865590" cy="817402"/>
+          </a:xfrm>
+          <a:prstGeom prst="bentConnector3">
+            <a:avLst>
+              <a:gd name="adj1" fmla="val 59003"/>
+            </a:avLst>
+          </a:prstGeom>
+        </p:spPr>
+        <p:style>
+          <a:lnRef idx="2">
+            <a:schemeClr val="dk1"/>
+          </a:lnRef>
+          <a:fillRef idx="0">
+            <a:schemeClr val="dk1"/>
+          </a:fillRef>
+          <a:effectRef idx="1">
+            <a:schemeClr val="dk1"/>
+          </a:effectRef>
+          <a:fontRef idx="minor">
+            <a:schemeClr val="tx1"/>
+          </a:fontRef>
+        </p:style>
+      </p:cxnSp>
+      <p:cxnSp>
+        <p:nvCxnSpPr>
+          <p:cNvPr id="8" name="Connector: Elbow 7">
+            <a:extLst>
+              <a:ext uri="{FF2B5EF4-FFF2-40B4-BE49-F238E27FC236}">
+                <a16:creationId xmlns:a16="http://schemas.microsoft.com/office/drawing/2014/main" id="{64EEBB60-42C5-34E5-D112-8A8B1D82CE64}"/>
+              </a:ext>
+            </a:extLst>
+          </p:cNvPr>
+          <p:cNvCxnSpPr>
+            <a:cxnSpLocks/>
+          </p:cNvCxnSpPr>
+          <p:nvPr/>
+        </p:nvCxnSpPr>
+        <p:spPr>
+          <a:xfrm>
+            <a:off x="6443134" y="1888046"/>
+            <a:ext cx="1833119" cy="979654"/>
+          </a:xfrm>
+          <a:prstGeom prst="bentConnector3">
+            <a:avLst>
+              <a:gd name="adj1" fmla="val 65270"/>
+            </a:avLst>
+          </a:prstGeom>
+          <a:ln>
+            <a:solidFill>
+              <a:srgbClr val="C00000"/>
+            </a:solidFill>
+          </a:ln>
+        </p:spPr>
+        <p:style>
+          <a:lnRef idx="2">
+            <a:schemeClr val="accent1"/>
+          </a:lnRef>
+          <a:fillRef idx="0">
+            <a:schemeClr val="accent1"/>
+          </a:fillRef>
+          <a:effectRef idx="1">
+            <a:schemeClr val="accent1"/>
+          </a:effectRef>
+          <a:fontRef idx="minor">
+            <a:schemeClr val="tx1"/>
+          </a:fontRef>
+        </p:style>
+      </p:cxnSp>
+      <p:cxnSp>
+        <p:nvCxnSpPr>
+          <p:cNvPr id="9" name="Straight Connector 8">
+            <a:extLst>
+              <a:ext uri="{FF2B5EF4-FFF2-40B4-BE49-F238E27FC236}">
+                <a16:creationId xmlns:a16="http://schemas.microsoft.com/office/drawing/2014/main" id="{0DA7ED0B-5491-9A7E-C24A-EFA5517EC2DE}"/>
+              </a:ext>
+            </a:extLst>
+          </p:cNvPr>
+          <p:cNvCxnSpPr>
+            <a:cxnSpLocks/>
+          </p:cNvCxnSpPr>
+          <p:nvPr/>
+        </p:nvCxnSpPr>
+        <p:spPr>
+          <a:xfrm>
+            <a:off x="2979575" y="1321407"/>
+            <a:ext cx="4886131" cy="0"/>
+          </a:xfrm>
+          <a:prstGeom prst="line">
+            <a:avLst/>
+          </a:prstGeom>
+        </p:spPr>
+        <p:style>
+          <a:lnRef idx="2">
+            <a:schemeClr val="accent1"/>
+          </a:lnRef>
+          <a:fillRef idx="0">
+            <a:schemeClr val="accent1"/>
+          </a:fillRef>
+          <a:effectRef idx="1">
+            <a:schemeClr val="accent1"/>
+          </a:effectRef>
+          <a:fontRef idx="minor">
+            <a:schemeClr val="tx1"/>
+          </a:fontRef>
+        </p:style>
+      </p:cxnSp>
+      <p:cxnSp>
+        <p:nvCxnSpPr>
+          <p:cNvPr id="18" name="Straight Connector 17">
+            <a:extLst>
+              <a:ext uri="{FF2B5EF4-FFF2-40B4-BE49-F238E27FC236}">
+                <a16:creationId xmlns:a16="http://schemas.microsoft.com/office/drawing/2014/main" id="{122A3FC3-26B7-A042-80FD-409825F937DD}"/>
+              </a:ext>
+            </a:extLst>
+          </p:cNvPr>
+          <p:cNvCxnSpPr>
+            <a:cxnSpLocks/>
+          </p:cNvCxnSpPr>
+          <p:nvPr/>
+        </p:nvCxnSpPr>
+        <p:spPr>
+          <a:xfrm flipV="1">
+            <a:off x="7856375" y="1321407"/>
+            <a:ext cx="0" cy="1355031"/>
+          </a:xfrm>
+          <a:prstGeom prst="line">
+            <a:avLst/>
+          </a:prstGeom>
+        </p:spPr>
+        <p:style>
+          <a:lnRef idx="2">
+            <a:schemeClr val="accent1"/>
+          </a:lnRef>
+          <a:fillRef idx="0">
+            <a:schemeClr val="accent1"/>
+          </a:fillRef>
+          <a:effectRef idx="1">
+            <a:schemeClr val="accent1"/>
+          </a:effectRef>
+          <a:fontRef idx="minor">
+            <a:schemeClr val="tx1"/>
+          </a:fontRef>
+        </p:style>
+      </p:cxnSp>
+      <p:cxnSp>
+        <p:nvCxnSpPr>
+          <p:cNvPr id="21" name="Straight Connector 20">
+            <a:extLst>
+              <a:ext uri="{FF2B5EF4-FFF2-40B4-BE49-F238E27FC236}">
+                <a16:creationId xmlns:a16="http://schemas.microsoft.com/office/drawing/2014/main" id="{0BF821A4-E0E0-4954-0FBC-E9941EE818DF}"/>
+              </a:ext>
+            </a:extLst>
+          </p:cNvPr>
+          <p:cNvCxnSpPr>
+            <a:cxnSpLocks/>
+            <a:stCxn id="6" idx="1"/>
+          </p:cNvCxnSpPr>
+          <p:nvPr/>
+        </p:nvCxnSpPr>
+        <p:spPr>
+          <a:xfrm flipH="1">
+            <a:off x="7865706" y="2676438"/>
+            <a:ext cx="243771" cy="0"/>
+          </a:xfrm>
+          <a:prstGeom prst="line">
+            <a:avLst/>
+          </a:prstGeom>
+        </p:spPr>
+        <p:style>
+          <a:lnRef idx="2">
+            <a:schemeClr val="accent1"/>
+          </a:lnRef>
+          <a:fillRef idx="0">
+            <a:schemeClr val="accent1"/>
+          </a:fillRef>
+          <a:effectRef idx="1">
+            <a:schemeClr val="accent1"/>
+          </a:effectRef>
+          <a:fontRef idx="minor">
+            <a:schemeClr val="tx1"/>
+          </a:fontRef>
+        </p:style>
+      </p:cxnSp>
+      <p:cxnSp>
+        <p:nvCxnSpPr>
+          <p:cNvPr id="26" name="Straight Connector 25">
+            <a:extLst>
+              <a:ext uri="{FF2B5EF4-FFF2-40B4-BE49-F238E27FC236}">
+                <a16:creationId xmlns:a16="http://schemas.microsoft.com/office/drawing/2014/main" id="{D73C7708-527A-AB03-DD31-817DA9464B52}"/>
+              </a:ext>
+            </a:extLst>
+          </p:cNvPr>
+          <p:cNvCxnSpPr>
+            <a:cxnSpLocks/>
+          </p:cNvCxnSpPr>
+          <p:nvPr/>
+        </p:nvCxnSpPr>
+        <p:spPr>
+          <a:xfrm flipV="1">
+            <a:off x="2979575" y="1321407"/>
+            <a:ext cx="0" cy="677515"/>
+          </a:xfrm>
+          <a:prstGeom prst="line">
+            <a:avLst/>
+          </a:prstGeom>
+        </p:spPr>
+        <p:style>
+          <a:lnRef idx="2">
+            <a:schemeClr val="accent1"/>
+          </a:lnRef>
+          <a:fillRef idx="0">
+            <a:schemeClr val="accent1"/>
+          </a:fillRef>
+          <a:effectRef idx="1">
+            <a:schemeClr val="accent1"/>
+          </a:effectRef>
+          <a:fontRef idx="minor">
+            <a:schemeClr val="tx1"/>
+          </a:fontRef>
+        </p:style>
+      </p:cxnSp>
+      <p:cxnSp>
+        <p:nvCxnSpPr>
+          <p:cNvPr id="29" name="Straight Connector 28">
+            <a:extLst>
+              <a:ext uri="{FF2B5EF4-FFF2-40B4-BE49-F238E27FC236}">
+                <a16:creationId xmlns:a16="http://schemas.microsoft.com/office/drawing/2014/main" id="{B169B759-85AE-6B47-E860-0AC5E067465B}"/>
+              </a:ext>
+            </a:extLst>
+          </p:cNvPr>
+          <p:cNvCxnSpPr>
+            <a:cxnSpLocks/>
+          </p:cNvCxnSpPr>
+          <p:nvPr/>
+        </p:nvCxnSpPr>
+        <p:spPr>
+          <a:xfrm flipH="1">
+            <a:off x="2979575" y="1998922"/>
+            <a:ext cx="734009" cy="0"/>
+          </a:xfrm>
+          <a:prstGeom prst="line">
+            <a:avLst/>
+          </a:prstGeom>
+        </p:spPr>
+        <p:style>
+          <a:lnRef idx="2">
+            <a:schemeClr val="accent1"/>
+          </a:lnRef>
+          <a:fillRef idx="0">
+            <a:schemeClr val="accent1"/>
+          </a:fillRef>
+          <a:effectRef idx="1">
+            <a:schemeClr val="accent1"/>
+          </a:effectRef>
+          <a:fontRef idx="minor">
+            <a:schemeClr val="tx1"/>
+          </a:fontRef>
+        </p:style>
+      </p:cxnSp>
+      <p:cxnSp>
+        <p:nvCxnSpPr>
+          <p:cNvPr id="33" name="Straight Connector 32">
+            <a:extLst>
+              <a:ext uri="{FF2B5EF4-FFF2-40B4-BE49-F238E27FC236}">
+                <a16:creationId xmlns:a16="http://schemas.microsoft.com/office/drawing/2014/main" id="{2DF28DAD-E41B-D8AC-893A-9536A665A52E}"/>
+              </a:ext>
+            </a:extLst>
+          </p:cNvPr>
+          <p:cNvCxnSpPr>
+            <a:cxnSpLocks/>
+          </p:cNvCxnSpPr>
+          <p:nvPr/>
+        </p:nvCxnSpPr>
+        <p:spPr>
+          <a:xfrm>
+            <a:off x="7981779" y="1545336"/>
+            <a:ext cx="0" cy="948796"/>
+          </a:xfrm>
+          <a:prstGeom prst="line">
+            <a:avLst/>
+          </a:prstGeom>
+        </p:spPr>
+        <p:style>
+          <a:lnRef idx="2">
+            <a:schemeClr val="accent3"/>
+          </a:lnRef>
+          <a:fillRef idx="0">
+            <a:schemeClr val="accent3"/>
+          </a:fillRef>
+          <a:effectRef idx="1">
+            <a:schemeClr val="accent3"/>
+          </a:effectRef>
+          <a:fontRef idx="minor">
+            <a:schemeClr val="tx1"/>
+          </a:fontRef>
+        </p:style>
+      </p:cxnSp>
+      <p:cxnSp>
+        <p:nvCxnSpPr>
+          <p:cNvPr id="37" name="Straight Connector 36">
+            <a:extLst>
+              <a:ext uri="{FF2B5EF4-FFF2-40B4-BE49-F238E27FC236}">
+                <a16:creationId xmlns:a16="http://schemas.microsoft.com/office/drawing/2014/main" id="{1B4E63D7-99CC-3D4D-4F11-AE0752511BAC}"/>
+              </a:ext>
+            </a:extLst>
+          </p:cNvPr>
+          <p:cNvCxnSpPr>
+            <a:cxnSpLocks/>
+          </p:cNvCxnSpPr>
+          <p:nvPr/>
+        </p:nvCxnSpPr>
+        <p:spPr>
+          <a:xfrm>
+            <a:off x="7981779" y="2494132"/>
+            <a:ext cx="201168" cy="0"/>
+          </a:xfrm>
+          <a:prstGeom prst="line">
+            <a:avLst/>
+          </a:prstGeom>
+        </p:spPr>
+        <p:style>
+          <a:lnRef idx="2">
+            <a:schemeClr val="accent3"/>
+          </a:lnRef>
+          <a:fillRef idx="0">
+            <a:schemeClr val="accent3"/>
+          </a:fillRef>
+          <a:effectRef idx="1">
+            <a:schemeClr val="accent3"/>
+          </a:effectRef>
+          <a:fontRef idx="minor">
+            <a:schemeClr val="tx1"/>
+          </a:fontRef>
+        </p:style>
+      </p:cxnSp>
+      <p:cxnSp>
+        <p:nvCxnSpPr>
+          <p:cNvPr id="40" name="Straight Connector 39">
+            <a:extLst>
+              <a:ext uri="{FF2B5EF4-FFF2-40B4-BE49-F238E27FC236}">
+                <a16:creationId xmlns:a16="http://schemas.microsoft.com/office/drawing/2014/main" id="{CCD98E46-DBBD-FAF7-A3DB-92D2BC8B1C4C}"/>
+              </a:ext>
+            </a:extLst>
+          </p:cNvPr>
+          <p:cNvCxnSpPr>
+            <a:cxnSpLocks/>
+          </p:cNvCxnSpPr>
+          <p:nvPr/>
+        </p:nvCxnSpPr>
+        <p:spPr>
+          <a:xfrm flipH="1">
+            <a:off x="3154680" y="1545336"/>
+            <a:ext cx="4827099" cy="0"/>
+          </a:xfrm>
+          <a:prstGeom prst="line">
+            <a:avLst/>
+          </a:prstGeom>
+        </p:spPr>
+        <p:style>
+          <a:lnRef idx="2">
+            <a:schemeClr val="accent3"/>
+          </a:lnRef>
+          <a:fillRef idx="0">
+            <a:schemeClr val="accent3"/>
+          </a:fillRef>
+          <a:effectRef idx="1">
+            <a:schemeClr val="accent3"/>
+          </a:effectRef>
+          <a:fontRef idx="minor">
+            <a:schemeClr val="tx1"/>
+          </a:fontRef>
+        </p:style>
+      </p:cxnSp>
+      <p:cxnSp>
+        <p:nvCxnSpPr>
+          <p:cNvPr id="43" name="Straight Connector 42">
+            <a:extLst>
+              <a:ext uri="{FF2B5EF4-FFF2-40B4-BE49-F238E27FC236}">
+                <a16:creationId xmlns:a16="http://schemas.microsoft.com/office/drawing/2014/main" id="{78992E36-26B7-0A2F-6726-3E5A1A155BDA}"/>
+              </a:ext>
+            </a:extLst>
+          </p:cNvPr>
+          <p:cNvCxnSpPr>
+            <a:cxnSpLocks/>
+          </p:cNvCxnSpPr>
+          <p:nvPr/>
+        </p:nvCxnSpPr>
+        <p:spPr>
+          <a:xfrm>
+            <a:off x="3154680" y="1545336"/>
+            <a:ext cx="0" cy="643685"/>
+          </a:xfrm>
+          <a:prstGeom prst="line">
+            <a:avLst/>
+          </a:prstGeom>
+        </p:spPr>
+        <p:style>
+          <a:lnRef idx="2">
+            <a:schemeClr val="accent3"/>
+          </a:lnRef>
+          <a:fillRef idx="0">
+            <a:schemeClr val="accent3"/>
+          </a:fillRef>
+          <a:effectRef idx="1">
+            <a:schemeClr val="accent3"/>
+          </a:effectRef>
+          <a:fontRef idx="minor">
+            <a:schemeClr val="tx1"/>
+          </a:fontRef>
+        </p:style>
+      </p:cxnSp>
+      <p:cxnSp>
+        <p:nvCxnSpPr>
+          <p:cNvPr id="45" name="Straight Connector 44">
+            <a:extLst>
+              <a:ext uri="{FF2B5EF4-FFF2-40B4-BE49-F238E27FC236}">
+                <a16:creationId xmlns:a16="http://schemas.microsoft.com/office/drawing/2014/main" id="{A6088202-EDD1-B812-3F04-2033A37CE3EF}"/>
+              </a:ext>
+            </a:extLst>
+          </p:cNvPr>
+          <p:cNvCxnSpPr>
+            <a:cxnSpLocks/>
+          </p:cNvCxnSpPr>
+          <p:nvPr/>
+        </p:nvCxnSpPr>
+        <p:spPr>
+          <a:xfrm>
+            <a:off x="3154680" y="2189021"/>
+            <a:ext cx="558904" cy="0"/>
+          </a:xfrm>
+          <a:prstGeom prst="line">
+            <a:avLst/>
+          </a:prstGeom>
+        </p:spPr>
+        <p:style>
+          <a:lnRef idx="2">
+            <a:schemeClr val="accent3"/>
+          </a:lnRef>
+          <a:fillRef idx="0">
+            <a:schemeClr val="accent3"/>
+          </a:fillRef>
+          <a:effectRef idx="1">
+            <a:schemeClr val="accent3"/>
+          </a:effectRef>
+          <a:fontRef idx="minor">
+            <a:schemeClr val="tx1"/>
+          </a:fontRef>
+        </p:style>
+      </p:cxnSp>
+      <p:sp>
+        <p:nvSpPr>
+          <p:cNvPr id="47" name="TextBox 46">
+            <a:extLst>
+              <a:ext uri="{FF2B5EF4-FFF2-40B4-BE49-F238E27FC236}">
+                <a16:creationId xmlns:a16="http://schemas.microsoft.com/office/drawing/2014/main" id="{2AE2E1FB-7F98-9BF1-8061-44C991D619C0}"/>
+              </a:ext>
+            </a:extLst>
+          </p:cNvPr>
+          <p:cNvSpPr txBox="1"/>
+          <p:nvPr/>
+        </p:nvSpPr>
+        <p:spPr>
+          <a:xfrm>
+            <a:off x="796453" y="1376059"/>
+            <a:ext cx="2008018" cy="338554"/>
+          </a:xfrm>
+          <a:prstGeom prst="rect">
+            <a:avLst/>
+          </a:prstGeom>
+          <a:noFill/>
+        </p:spPr>
+        <p:txBody>
+          <a:bodyPr wrap="square" rtlCol="0">
+            <a:spAutoFit/>
+          </a:bodyPr>
+          <a:lstStyle/>
+          <a:p>
+            <a:r>
+              <a:rPr lang="en-US" sz="1600" b="1" dirty="0"/>
+              <a:t>Raspberry PI</a:t>
+            </a:r>
+            <a:endParaRPr lang="en-SG" sz="1600" b="1" dirty="0"/>
+          </a:p>
+        </p:txBody>
+      </p:sp>
+      <p:sp>
+        <p:nvSpPr>
+          <p:cNvPr id="48" name="TextBox 47">
+            <a:extLst>
+              <a:ext uri="{FF2B5EF4-FFF2-40B4-BE49-F238E27FC236}">
+                <a16:creationId xmlns:a16="http://schemas.microsoft.com/office/drawing/2014/main" id="{B325AE77-283D-6174-1F0C-B3CDF395B0DD}"/>
+              </a:ext>
+            </a:extLst>
+          </p:cNvPr>
+          <p:cNvSpPr txBox="1"/>
+          <p:nvPr/>
+        </p:nvSpPr>
+        <p:spPr>
+          <a:xfrm>
+            <a:off x="8182947" y="1256260"/>
+            <a:ext cx="2008018" cy="338554"/>
+          </a:xfrm>
+          <a:prstGeom prst="rect">
+            <a:avLst/>
+          </a:prstGeom>
+          <a:noFill/>
+        </p:spPr>
+        <p:txBody>
+          <a:bodyPr wrap="square" rtlCol="0">
+            <a:spAutoFit/>
+          </a:bodyPr>
+          <a:lstStyle/>
+          <a:p>
+            <a:r>
+              <a:rPr lang="en-US" sz="1600" b="1"/>
+              <a:t>I2C DS1307 RTC</a:t>
+            </a:r>
+            <a:endParaRPr lang="en-SG" sz="1600" b="1" dirty="0"/>
+          </a:p>
+        </p:txBody>
+      </p:sp>
+      <p:graphicFrame>
+        <p:nvGraphicFramePr>
+          <p:cNvPr id="49" name="Table 48">
+            <a:extLst>
+              <a:ext uri="{FF2B5EF4-FFF2-40B4-BE49-F238E27FC236}">
+                <a16:creationId xmlns:a16="http://schemas.microsoft.com/office/drawing/2014/main" id="{F95B7FE7-7002-9CF6-521F-BDDAA1AEAFF4}"/>
+              </a:ext>
+            </a:extLst>
+          </p:cNvPr>
+          <p:cNvGraphicFramePr>
+            <a:graphicFrameLocks noGrp="1"/>
+          </p:cNvGraphicFramePr>
+          <p:nvPr>
+            <p:extLst>
+              <p:ext uri="{D42A27DB-BD31-4B8C-83A1-F6EECF244321}">
+                <p14:modId xmlns:p14="http://schemas.microsoft.com/office/powerpoint/2010/main" val="1122892439"/>
+              </p:ext>
+            </p:extLst>
+          </p:nvPr>
+        </p:nvGraphicFramePr>
+        <p:xfrm>
+          <a:off x="7262498" y="3689908"/>
+          <a:ext cx="2886978" cy="1408651"/>
+        </p:xfrm>
+        <a:graphic>
+          <a:graphicData uri="http://schemas.openxmlformats.org/drawingml/2006/table">
+            <a:tbl>
+              <a:tblPr firstRow="1" bandRow="1">
+                <a:tableStyleId>{5C22544A-7EE6-4342-B048-85BDC9FD1C3A}</a:tableStyleId>
+              </a:tblPr>
+              <a:tblGrid>
+                <a:gridCol w="1443489">
+                  <a:extLst>
+                    <a:ext uri="{9D8B030D-6E8A-4147-A177-3AD203B41FA5}">
+                      <a16:colId xmlns:a16="http://schemas.microsoft.com/office/drawing/2014/main" val="1826065628"/>
+                    </a:ext>
+                  </a:extLst>
+                </a:gridCol>
+                <a:gridCol w="1443489">
+                  <a:extLst>
+                    <a:ext uri="{9D8B030D-6E8A-4147-A177-3AD203B41FA5}">
+                      <a16:colId xmlns:a16="http://schemas.microsoft.com/office/drawing/2014/main" val="4229361534"/>
+                    </a:ext>
+                  </a:extLst>
+                </a:gridCol>
+              </a:tblGrid>
+              <a:tr h="314699">
+                <a:tc>
+                  <a:txBody>
+                    <a:bodyPr/>
+                    <a:lstStyle/>
+                    <a:p>
+                      <a:pPr marL="0" marR="0" lvl="0" indent="0" algn="l" defTabSz="914400" rtl="0" eaLnBrk="1" fontAlgn="auto" latinLnBrk="0" hangingPunct="1">
+                        <a:lnSpc>
+                          <a:spcPct val="100000"/>
+                        </a:lnSpc>
+                        <a:spcBef>
+                          <a:spcPts val="0"/>
+                        </a:spcBef>
+                        <a:spcAft>
+                          <a:spcPts val="0"/>
+                        </a:spcAft>
+                        <a:buClrTx/>
+                        <a:buSzTx/>
+                        <a:buFontTx/>
+                        <a:buNone/>
+                        <a:tabLst/>
+                        <a:defRPr/>
+                      </a:pPr>
+                      <a:r>
+                        <a:rPr lang="en-US" sz="1100" b="1" dirty="0"/>
+                        <a:t>I2C DS1307 RTC</a:t>
+                      </a:r>
+                      <a:endParaRPr lang="en-SG" sz="1100" b="1" dirty="0"/>
+                    </a:p>
+                  </a:txBody>
+                  <a:tcPr>
+                    <a:lnL w="12700" cap="flat" cmpd="sng" algn="ctr">
+                      <a:solidFill>
+                        <a:schemeClr val="tx1"/>
+                      </a:solidFill>
+                      <a:prstDash val="solid"/>
+                      <a:round/>
+                      <a:headEnd type="none" w="med" len="med"/>
+                      <a:tailEnd type="none" w="med" len="med"/>
+                    </a:lnL>
+                    <a:lnT w="12700" cap="flat" cmpd="sng" algn="ctr">
+                      <a:solidFill>
+                        <a:schemeClr val="tx1"/>
+                      </a:solidFill>
+                      <a:prstDash val="solid"/>
+                      <a:round/>
+                      <a:headEnd type="none" w="med" len="med"/>
+                      <a:tailEnd type="none" w="med" len="med"/>
+                    </a:lnT>
+                  </a:tcPr>
+                </a:tc>
+                <a:tc>
+                  <a:txBody>
+                    <a:bodyPr/>
+                    <a:lstStyle/>
+                    <a:p>
+                      <a:r>
+                        <a:rPr lang="en-US" sz="1100" b="1" dirty="0"/>
+                        <a:t>Raspberry PI</a:t>
+                      </a:r>
+                      <a:endParaRPr lang="en-SG" sz="1100" b="1" dirty="0"/>
+                    </a:p>
+                  </a:txBody>
+                  <a:tcPr>
+                    <a:lnR w="12700" cap="flat" cmpd="sng" algn="ctr">
+                      <a:solidFill>
+                        <a:schemeClr val="tx1"/>
+                      </a:solidFill>
+                      <a:prstDash val="solid"/>
+                      <a:round/>
+                      <a:headEnd type="none" w="med" len="med"/>
+                      <a:tailEnd type="none" w="med" len="med"/>
+                    </a:lnR>
+                    <a:lnT w="12700" cap="flat" cmpd="sng" algn="ctr">
+                      <a:solidFill>
+                        <a:schemeClr val="tx1"/>
+                      </a:solidFill>
+                      <a:prstDash val="solid"/>
+                      <a:round/>
+                      <a:headEnd type="none" w="med" len="med"/>
+                      <a:tailEnd type="none" w="med" len="med"/>
+                    </a:lnT>
+                  </a:tcPr>
+                </a:tc>
+                <a:extLst>
+                  <a:ext uri="{0D108BD9-81ED-4DB2-BD59-A6C34878D82A}">
+                    <a16:rowId xmlns:a16="http://schemas.microsoft.com/office/drawing/2014/main" val="469430213"/>
+                  </a:ext>
+                </a:extLst>
+              </a:tr>
+              <a:tr h="273488">
+                <a:tc>
+                  <a:txBody>
+                    <a:bodyPr/>
+                    <a:lstStyle/>
+                    <a:p>
+                      <a:r>
+                        <a:rPr lang="en-US" sz="1100" b="1" dirty="0"/>
+                        <a:t>SCL</a:t>
+                      </a:r>
+                      <a:endParaRPr lang="en-SG" sz="1100" b="1" dirty="0"/>
+                    </a:p>
+                  </a:txBody>
+                  <a:tcPr>
+                    <a:lnL w="12700" cap="flat" cmpd="sng" algn="ctr">
+                      <a:solidFill>
+                        <a:schemeClr val="tx1"/>
+                      </a:solidFill>
+                      <a:prstDash val="solid"/>
+                      <a:round/>
+                      <a:headEnd type="none" w="med" len="med"/>
+                      <a:tailEnd type="none" w="med" len="med"/>
+                    </a:lnL>
+                  </a:tcPr>
+                </a:tc>
+                <a:tc>
+                  <a:txBody>
+                    <a:bodyPr/>
+                    <a:lstStyle/>
+                    <a:p>
+                      <a:r>
+                        <a:rPr lang="en-US" sz="1100" b="1" dirty="0"/>
+                        <a:t>Pin5 GPIO 3</a:t>
+                      </a:r>
+                      <a:endParaRPr lang="en-SG" sz="1100" b="1" dirty="0"/>
+                    </a:p>
+                  </a:txBody>
+                  <a:tcPr>
+                    <a:lnR w="12700" cap="flat" cmpd="sng" algn="ctr">
+                      <a:solidFill>
+                        <a:schemeClr val="tx1"/>
+                      </a:solidFill>
+                      <a:prstDash val="solid"/>
+                      <a:round/>
+                      <a:headEnd type="none" w="med" len="med"/>
+                      <a:tailEnd type="none" w="med" len="med"/>
+                    </a:lnR>
+                  </a:tcPr>
+                </a:tc>
+                <a:extLst>
+                  <a:ext uri="{0D108BD9-81ED-4DB2-BD59-A6C34878D82A}">
+                    <a16:rowId xmlns:a16="http://schemas.microsoft.com/office/drawing/2014/main" val="327203730"/>
+                  </a:ext>
+                </a:extLst>
+              </a:tr>
+              <a:tr h="273488">
+                <a:tc>
+                  <a:txBody>
+                    <a:bodyPr/>
+                    <a:lstStyle/>
+                    <a:p>
+                      <a:r>
+                        <a:rPr lang="en-US" sz="1100" b="1" dirty="0"/>
+                        <a:t>SDA</a:t>
+                      </a:r>
+                      <a:endParaRPr lang="en-SG" sz="1100" b="1" dirty="0"/>
+                    </a:p>
+                  </a:txBody>
+                  <a:tcPr>
+                    <a:lnL w="12700" cap="flat" cmpd="sng" algn="ctr">
+                      <a:solidFill>
+                        <a:schemeClr val="tx1"/>
+                      </a:solidFill>
+                      <a:prstDash val="solid"/>
+                      <a:round/>
+                      <a:headEnd type="none" w="med" len="med"/>
+                      <a:tailEnd type="none" w="med" len="med"/>
+                    </a:lnL>
+                  </a:tcPr>
+                </a:tc>
+                <a:tc>
+                  <a:txBody>
+                    <a:bodyPr/>
+                    <a:lstStyle/>
+                    <a:p>
+                      <a:r>
+                        <a:rPr lang="en-US" sz="1100" b="1" dirty="0"/>
+                        <a:t>Pin3 GPIO 2</a:t>
+                      </a:r>
+                      <a:endParaRPr lang="en-SG" sz="1100" b="1" dirty="0"/>
+                    </a:p>
+                  </a:txBody>
+                  <a:tcPr>
+                    <a:lnR w="12700" cap="flat" cmpd="sng" algn="ctr">
+                      <a:solidFill>
+                        <a:schemeClr val="tx1"/>
+                      </a:solidFill>
+                      <a:prstDash val="solid"/>
+                      <a:round/>
+                      <a:headEnd type="none" w="med" len="med"/>
+                      <a:tailEnd type="none" w="med" len="med"/>
+                    </a:lnR>
+                  </a:tcPr>
+                </a:tc>
+                <a:extLst>
+                  <a:ext uri="{0D108BD9-81ED-4DB2-BD59-A6C34878D82A}">
+                    <a16:rowId xmlns:a16="http://schemas.microsoft.com/office/drawing/2014/main" val="3910572589"/>
+                  </a:ext>
+                </a:extLst>
+              </a:tr>
+              <a:tr h="273488">
+                <a:tc>
+                  <a:txBody>
+                    <a:bodyPr/>
+                    <a:lstStyle/>
+                    <a:p>
+                      <a:r>
+                        <a:rPr lang="en-US" sz="1100" b="1" dirty="0"/>
+                        <a:t>VCC</a:t>
+                      </a:r>
+                      <a:endParaRPr lang="en-SG" sz="1100" b="1" dirty="0"/>
+                    </a:p>
+                  </a:txBody>
+                  <a:tcPr>
+                    <a:lnL w="12700" cap="flat" cmpd="sng" algn="ctr">
+                      <a:solidFill>
+                        <a:schemeClr val="tx1"/>
+                      </a:solidFill>
+                      <a:prstDash val="solid"/>
+                      <a:round/>
+                      <a:headEnd type="none" w="med" len="med"/>
+                      <a:tailEnd type="none" w="med" len="med"/>
+                    </a:lnL>
+                  </a:tcPr>
+                </a:tc>
+                <a:tc>
+                  <a:txBody>
+                    <a:bodyPr/>
+                    <a:lstStyle/>
+                    <a:p>
+                      <a:r>
+                        <a:rPr lang="en-US" sz="1100" b="1" dirty="0"/>
+                        <a:t>Pin4 5V Power</a:t>
+                      </a:r>
+                      <a:endParaRPr lang="en-SG" sz="1100" b="1" dirty="0"/>
+                    </a:p>
+                  </a:txBody>
+                  <a:tcPr>
+                    <a:lnR w="12700" cap="flat" cmpd="sng" algn="ctr">
+                      <a:solidFill>
+                        <a:schemeClr val="tx1"/>
+                      </a:solidFill>
+                      <a:prstDash val="solid"/>
+                      <a:round/>
+                      <a:headEnd type="none" w="med" len="med"/>
+                      <a:tailEnd type="none" w="med" len="med"/>
+                    </a:lnR>
+                  </a:tcPr>
+                </a:tc>
+                <a:extLst>
+                  <a:ext uri="{0D108BD9-81ED-4DB2-BD59-A6C34878D82A}">
+                    <a16:rowId xmlns:a16="http://schemas.microsoft.com/office/drawing/2014/main" val="3779759631"/>
+                  </a:ext>
+                </a:extLst>
+              </a:tr>
+              <a:tr h="273488">
+                <a:tc>
+                  <a:txBody>
+                    <a:bodyPr/>
+                    <a:lstStyle/>
+                    <a:p>
+                      <a:r>
+                        <a:rPr lang="en-US" sz="1100" b="1" dirty="0"/>
+                        <a:t>GND</a:t>
+                      </a:r>
+                      <a:endParaRPr lang="en-SG" sz="1100" b="1" dirty="0"/>
+                    </a:p>
+                  </a:txBody>
+                  <a:tcPr>
+                    <a:lnL w="12700" cap="flat" cmpd="sng" algn="ctr">
+                      <a:solidFill>
+                        <a:schemeClr val="tx1"/>
+                      </a:solidFill>
+                      <a:prstDash val="solid"/>
+                      <a:round/>
+                      <a:headEnd type="none" w="med" len="med"/>
+                      <a:tailEnd type="none" w="med" len="med"/>
+                    </a:lnL>
+                    <a:lnB w="12700" cap="flat" cmpd="sng" algn="ctr">
+                      <a:solidFill>
+                        <a:schemeClr val="tx1"/>
+                      </a:solidFill>
+                      <a:prstDash val="solid"/>
+                      <a:round/>
+                      <a:headEnd type="none" w="med" len="med"/>
+                      <a:tailEnd type="none" w="med" len="med"/>
+                    </a:lnB>
+                  </a:tcPr>
+                </a:tc>
+                <a:tc>
+                  <a:txBody>
+                    <a:bodyPr/>
+                    <a:lstStyle/>
+                    <a:p>
+                      <a:pPr marL="0" marR="0" lvl="0" indent="0" algn="l" defTabSz="914400" rtl="0" eaLnBrk="1" fontAlgn="auto" latinLnBrk="0" hangingPunct="1">
+                        <a:lnSpc>
+                          <a:spcPct val="100000"/>
+                        </a:lnSpc>
+                        <a:spcBef>
+                          <a:spcPts val="0"/>
+                        </a:spcBef>
+                        <a:spcAft>
+                          <a:spcPts val="0"/>
+                        </a:spcAft>
+                        <a:buClrTx/>
+                        <a:buSzTx/>
+                        <a:buFontTx/>
+                        <a:buNone/>
+                        <a:tabLst/>
+                        <a:defRPr/>
+                      </a:pPr>
+                      <a:r>
+                        <a:rPr lang="en-US" sz="1100" b="1" dirty="0"/>
+                        <a:t>Pin6 Ground</a:t>
+                      </a:r>
+                      <a:endParaRPr lang="en-SG" sz="1100" b="1" dirty="0"/>
+                    </a:p>
+                  </a:txBody>
+                  <a:tcPr>
+                    <a:lnR w="12700" cap="flat" cmpd="sng" algn="ctr">
+                      <a:solidFill>
+                        <a:schemeClr val="tx1"/>
+                      </a:solidFill>
+                      <a:prstDash val="solid"/>
+                      <a:round/>
+                      <a:headEnd type="none" w="med" len="med"/>
+                      <a:tailEnd type="none" w="med" len="med"/>
+                    </a:lnR>
+                    <a:lnB w="12700" cap="flat" cmpd="sng" algn="ctr">
+                      <a:solidFill>
+                        <a:schemeClr val="tx1"/>
+                      </a:solidFill>
+                      <a:prstDash val="solid"/>
+                      <a:round/>
+                      <a:headEnd type="none" w="med" len="med"/>
+                      <a:tailEnd type="none" w="med" len="med"/>
+                    </a:lnB>
+                  </a:tcPr>
+                </a:tc>
+                <a:extLst>
+                  <a:ext uri="{0D108BD9-81ED-4DB2-BD59-A6C34878D82A}">
+                    <a16:rowId xmlns:a16="http://schemas.microsoft.com/office/drawing/2014/main" val="4226769121"/>
+                  </a:ext>
+                </a:extLst>
+              </a:tr>
+            </a:tbl>
+          </a:graphicData>
+        </a:graphic>
+      </p:graphicFrame>
+    </p:spTree>
+    <p:extLst>
+      <p:ext uri="{BB962C8B-B14F-4D97-AF65-F5344CB8AC3E}">
+        <p14:creationId xmlns:p14="http://schemas.microsoft.com/office/powerpoint/2010/main" val="2301063278"/>
       </p:ext>
     </p:extLst>
   </p:cSld>

</xml_diff>

<commit_message>
update the design document and the title image.
</commit_message>
<xml_diff>
--- a/doc/designDoc.pptx
+++ b/doc/designDoc.pptx
@@ -6,9 +6,10 @@
   </p:sldMasterIdLst>
   <p:sldIdLst>
     <p:sldId id="259" r:id="rId2"/>
-    <p:sldId id="256" r:id="rId3"/>
-    <p:sldId id="257" r:id="rId4"/>
-    <p:sldId id="258" r:id="rId5"/>
+    <p:sldId id="260" r:id="rId3"/>
+    <p:sldId id="256" r:id="rId4"/>
+    <p:sldId id="257" r:id="rId5"/>
+    <p:sldId id="258" r:id="rId6"/>
   </p:sldIdLst>
   <p:sldSz cx="12192000" cy="6858000"/>
   <p:notesSz cx="6858000" cy="9144000"/>
@@ -264,7 +265,7 @@
           <a:p>
             <a:fld id="{502094D7-3A6B-4785-A861-5FFE105C9C1C}" type="datetimeFigureOut">
               <a:rPr lang="en-SG" smtClean="0"/>
-              <a:t>14/8/2024</a:t>
+              <a:t>15/8/2024</a:t>
             </a:fld>
             <a:endParaRPr lang="en-SG"/>
           </a:p>
@@ -464,7 +465,7 @@
           <a:p>
             <a:fld id="{502094D7-3A6B-4785-A861-5FFE105C9C1C}" type="datetimeFigureOut">
               <a:rPr lang="en-SG" smtClean="0"/>
-              <a:t>14/8/2024</a:t>
+              <a:t>15/8/2024</a:t>
             </a:fld>
             <a:endParaRPr lang="en-SG"/>
           </a:p>
@@ -674,7 +675,7 @@
           <a:p>
             <a:fld id="{502094D7-3A6B-4785-A861-5FFE105C9C1C}" type="datetimeFigureOut">
               <a:rPr lang="en-SG" smtClean="0"/>
-              <a:t>14/8/2024</a:t>
+              <a:t>15/8/2024</a:t>
             </a:fld>
             <a:endParaRPr lang="en-SG"/>
           </a:p>
@@ -874,7 +875,7 @@
           <a:p>
             <a:fld id="{502094D7-3A6B-4785-A861-5FFE105C9C1C}" type="datetimeFigureOut">
               <a:rPr lang="en-SG" smtClean="0"/>
-              <a:t>14/8/2024</a:t>
+              <a:t>15/8/2024</a:t>
             </a:fld>
             <a:endParaRPr lang="en-SG"/>
           </a:p>
@@ -1150,7 +1151,7 @@
           <a:p>
             <a:fld id="{502094D7-3A6B-4785-A861-5FFE105C9C1C}" type="datetimeFigureOut">
               <a:rPr lang="en-SG" smtClean="0"/>
-              <a:t>14/8/2024</a:t>
+              <a:t>15/8/2024</a:t>
             </a:fld>
             <a:endParaRPr lang="en-SG"/>
           </a:p>
@@ -1418,7 +1419,7 @@
           <a:p>
             <a:fld id="{502094D7-3A6B-4785-A861-5FFE105C9C1C}" type="datetimeFigureOut">
               <a:rPr lang="en-SG" smtClean="0"/>
-              <a:t>14/8/2024</a:t>
+              <a:t>15/8/2024</a:t>
             </a:fld>
             <a:endParaRPr lang="en-SG"/>
           </a:p>
@@ -1833,7 +1834,7 @@
           <a:p>
             <a:fld id="{502094D7-3A6B-4785-A861-5FFE105C9C1C}" type="datetimeFigureOut">
               <a:rPr lang="en-SG" smtClean="0"/>
-              <a:t>14/8/2024</a:t>
+              <a:t>15/8/2024</a:t>
             </a:fld>
             <a:endParaRPr lang="en-SG"/>
           </a:p>
@@ -1975,7 +1976,7 @@
           <a:p>
             <a:fld id="{502094D7-3A6B-4785-A861-5FFE105C9C1C}" type="datetimeFigureOut">
               <a:rPr lang="en-SG" smtClean="0"/>
-              <a:t>14/8/2024</a:t>
+              <a:t>15/8/2024</a:t>
             </a:fld>
             <a:endParaRPr lang="en-SG"/>
           </a:p>
@@ -2088,7 +2089,7 @@
           <a:p>
             <a:fld id="{502094D7-3A6B-4785-A861-5FFE105C9C1C}" type="datetimeFigureOut">
               <a:rPr lang="en-SG" smtClean="0"/>
-              <a:t>14/8/2024</a:t>
+              <a:t>15/8/2024</a:t>
             </a:fld>
             <a:endParaRPr lang="en-SG"/>
           </a:p>
@@ -2401,7 +2402,7 @@
           <a:p>
             <a:fld id="{502094D7-3A6B-4785-A861-5FFE105C9C1C}" type="datetimeFigureOut">
               <a:rPr lang="en-SG" smtClean="0"/>
-              <a:t>14/8/2024</a:t>
+              <a:t>15/8/2024</a:t>
             </a:fld>
             <a:endParaRPr lang="en-SG"/>
           </a:p>
@@ -2690,7 +2691,7 @@
           <a:p>
             <a:fld id="{502094D7-3A6B-4785-A861-5FFE105C9C1C}" type="datetimeFigureOut">
               <a:rPr lang="en-SG" smtClean="0"/>
-              <a:t>14/8/2024</a:t>
+              <a:t>15/8/2024</a:t>
             </a:fld>
             <a:endParaRPr lang="en-SG"/>
           </a:p>
@@ -2933,7 +2934,7 @@
           <a:p>
             <a:fld id="{502094D7-3A6B-4785-A861-5FFE105C9C1C}" type="datetimeFigureOut">
               <a:rPr lang="en-SG" smtClean="0"/>
-              <a:t>14/8/2024</a:t>
+              <a:t>15/8/2024</a:t>
             </a:fld>
             <a:endParaRPr lang="en-SG"/>
           </a:p>
@@ -3677,6 +3678,838 @@
 </file>
 
 <file path=ppt/slides/slide2.xml><?xml version="1.0" encoding="utf-8"?>
+<p:sld xmlns:a="http://schemas.openxmlformats.org/drawingml/2006/main" xmlns:r="http://schemas.openxmlformats.org/officeDocument/2006/relationships" xmlns:p="http://schemas.openxmlformats.org/presentationml/2006/main">
+  <p:cSld>
+    <p:spTree>
+      <p:nvGrpSpPr>
+        <p:cNvPr id="1" name=""/>
+        <p:cNvGrpSpPr/>
+        <p:nvPr/>
+      </p:nvGrpSpPr>
+      <p:grpSpPr>
+        <a:xfrm>
+          <a:off x="0" y="0"/>
+          <a:ext cx="0" cy="0"/>
+          <a:chOff x="0" y="0"/>
+          <a:chExt cx="0" cy="0"/>
+        </a:xfrm>
+      </p:grpSpPr>
+      <p:sp>
+        <p:nvSpPr>
+          <p:cNvPr id="24" name="Rectangle 23">
+            <a:extLst>
+              <a:ext uri="{FF2B5EF4-FFF2-40B4-BE49-F238E27FC236}">
+                <a16:creationId xmlns:a16="http://schemas.microsoft.com/office/drawing/2014/main" id="{B2C86209-4A7D-2B24-71A5-4BA44EF3190C}"/>
+              </a:ext>
+            </a:extLst>
+          </p:cNvPr>
+          <p:cNvSpPr/>
+          <p:nvPr/>
+        </p:nvSpPr>
+        <p:spPr>
+          <a:xfrm>
+            <a:off x="6495412" y="4458703"/>
+            <a:ext cx="3096643" cy="1320281"/>
+          </a:xfrm>
+          <a:prstGeom prst="rect">
+            <a:avLst/>
+          </a:prstGeom>
+          <a:noFill/>
+          <a:ln w="19050">
+            <a:prstDash val="sysDash"/>
+          </a:ln>
+        </p:spPr>
+        <p:style>
+          <a:lnRef idx="2">
+            <a:schemeClr val="accent1">
+              <a:shade val="15000"/>
+            </a:schemeClr>
+          </a:lnRef>
+          <a:fillRef idx="1">
+            <a:schemeClr val="accent1"/>
+          </a:fillRef>
+          <a:effectRef idx="0">
+            <a:schemeClr val="accent1"/>
+          </a:effectRef>
+          <a:fontRef idx="minor">
+            <a:schemeClr val="lt1"/>
+          </a:fontRef>
+        </p:style>
+        <p:txBody>
+          <a:bodyPr rtlCol="0" anchor="ctr"/>
+          <a:lstStyle/>
+          <a:p>
+            <a:pPr algn="ctr"/>
+            <a:endParaRPr lang="en-SG"/>
+          </a:p>
+        </p:txBody>
+      </p:sp>
+      <p:sp>
+        <p:nvSpPr>
+          <p:cNvPr id="23" name="Rectangle 22">
+            <a:extLst>
+              <a:ext uri="{FF2B5EF4-FFF2-40B4-BE49-F238E27FC236}">
+                <a16:creationId xmlns:a16="http://schemas.microsoft.com/office/drawing/2014/main" id="{D79A141D-AE90-186B-F002-F88300E7011C}"/>
+              </a:ext>
+            </a:extLst>
+          </p:cNvPr>
+          <p:cNvSpPr/>
+          <p:nvPr/>
+        </p:nvSpPr>
+        <p:spPr>
+          <a:xfrm>
+            <a:off x="6495412" y="2853817"/>
+            <a:ext cx="3096642" cy="1368513"/>
+          </a:xfrm>
+          <a:prstGeom prst="rect">
+            <a:avLst/>
+          </a:prstGeom>
+          <a:noFill/>
+          <a:ln w="19050">
+            <a:solidFill>
+              <a:schemeClr val="tx1"/>
+            </a:solidFill>
+            <a:prstDash val="sysDash"/>
+          </a:ln>
+        </p:spPr>
+        <p:style>
+          <a:lnRef idx="2">
+            <a:schemeClr val="accent1">
+              <a:shade val="15000"/>
+            </a:schemeClr>
+          </a:lnRef>
+          <a:fillRef idx="1">
+            <a:schemeClr val="accent1"/>
+          </a:fillRef>
+          <a:effectRef idx="0">
+            <a:schemeClr val="accent1"/>
+          </a:effectRef>
+          <a:fontRef idx="minor">
+            <a:schemeClr val="lt1"/>
+          </a:fontRef>
+        </p:style>
+        <p:txBody>
+          <a:bodyPr rtlCol="0" anchor="ctr"/>
+          <a:lstStyle/>
+          <a:p>
+            <a:pPr algn="ctr"/>
+            <a:endParaRPr lang="en-SG"/>
+          </a:p>
+        </p:txBody>
+      </p:sp>
+      <p:sp>
+        <p:nvSpPr>
+          <p:cNvPr id="10" name="Rectangle 9">
+            <a:extLst>
+              <a:ext uri="{FF2B5EF4-FFF2-40B4-BE49-F238E27FC236}">
+                <a16:creationId xmlns:a16="http://schemas.microsoft.com/office/drawing/2014/main" id="{48B98D23-DF0F-B504-BFB0-7EE3355D5963}"/>
+              </a:ext>
+            </a:extLst>
+          </p:cNvPr>
+          <p:cNvSpPr/>
+          <p:nvPr/>
+        </p:nvSpPr>
+        <p:spPr>
+          <a:xfrm>
+            <a:off x="6495413" y="1216508"/>
+            <a:ext cx="3096642" cy="1368514"/>
+          </a:xfrm>
+          <a:prstGeom prst="rect">
+            <a:avLst/>
+          </a:prstGeom>
+          <a:noFill/>
+          <a:ln w="19050">
+            <a:prstDash val="sysDash"/>
+          </a:ln>
+        </p:spPr>
+        <p:style>
+          <a:lnRef idx="2">
+            <a:schemeClr val="accent1">
+              <a:shade val="15000"/>
+            </a:schemeClr>
+          </a:lnRef>
+          <a:fillRef idx="1">
+            <a:schemeClr val="accent1"/>
+          </a:fillRef>
+          <a:effectRef idx="0">
+            <a:schemeClr val="accent1"/>
+          </a:effectRef>
+          <a:fontRef idx="minor">
+            <a:schemeClr val="lt1"/>
+          </a:fontRef>
+        </p:style>
+        <p:txBody>
+          <a:bodyPr rtlCol="0" anchor="ctr"/>
+          <a:lstStyle/>
+          <a:p>
+            <a:pPr algn="ctr"/>
+            <a:endParaRPr lang="en-SG"/>
+          </a:p>
+        </p:txBody>
+      </p:sp>
+      <p:pic>
+        <p:nvPicPr>
+          <p:cNvPr id="5" name="Picture 4">
+            <a:extLst>
+              <a:ext uri="{FF2B5EF4-FFF2-40B4-BE49-F238E27FC236}">
+                <a16:creationId xmlns:a16="http://schemas.microsoft.com/office/drawing/2014/main" id="{E41F49E2-187A-29A3-A5A5-A74216986932}"/>
+              </a:ext>
+            </a:extLst>
+          </p:cNvPr>
+          <p:cNvPicPr>
+            <a:picLocks noChangeAspect="1"/>
+          </p:cNvPicPr>
+          <p:nvPr/>
+        </p:nvPicPr>
+        <p:blipFill>
+          <a:blip r:embed="rId2"/>
+          <a:stretch>
+            <a:fillRect/>
+          </a:stretch>
+        </p:blipFill>
+        <p:spPr>
+          <a:xfrm>
+            <a:off x="6599125" y="1294819"/>
+            <a:ext cx="719765" cy="644249"/>
+          </a:xfrm>
+          <a:prstGeom prst="rect">
+            <a:avLst/>
+          </a:prstGeom>
+        </p:spPr>
+      </p:pic>
+      <p:pic>
+        <p:nvPicPr>
+          <p:cNvPr id="9" name="Picture 8">
+            <a:extLst>
+              <a:ext uri="{FF2B5EF4-FFF2-40B4-BE49-F238E27FC236}">
+                <a16:creationId xmlns:a16="http://schemas.microsoft.com/office/drawing/2014/main" id="{9D2A9C6C-2906-0E87-D292-DCB3A888D98B}"/>
+              </a:ext>
+            </a:extLst>
+          </p:cNvPr>
+          <p:cNvPicPr>
+            <a:picLocks noChangeAspect="1"/>
+          </p:cNvPicPr>
+          <p:nvPr/>
+        </p:nvPicPr>
+        <p:blipFill>
+          <a:blip r:embed="rId3"/>
+          <a:stretch>
+            <a:fillRect/>
+          </a:stretch>
+        </p:blipFill>
+        <p:spPr>
+          <a:xfrm>
+            <a:off x="7680761" y="1310743"/>
+            <a:ext cx="1793669" cy="1107611"/>
+          </a:xfrm>
+          <a:prstGeom prst="rect">
+            <a:avLst/>
+          </a:prstGeom>
+        </p:spPr>
+      </p:pic>
+      <p:pic>
+        <p:nvPicPr>
+          <p:cNvPr id="14" name="Picture 13">
+            <a:extLst>
+              <a:ext uri="{FF2B5EF4-FFF2-40B4-BE49-F238E27FC236}">
+                <a16:creationId xmlns:a16="http://schemas.microsoft.com/office/drawing/2014/main" id="{B756270B-D6AB-0553-FB2B-521130E57315}"/>
+              </a:ext>
+            </a:extLst>
+          </p:cNvPr>
+          <p:cNvPicPr>
+            <a:picLocks noChangeAspect="1"/>
+          </p:cNvPicPr>
+          <p:nvPr/>
+        </p:nvPicPr>
+        <p:blipFill>
+          <a:blip r:embed="rId4"/>
+          <a:stretch>
+            <a:fillRect/>
+          </a:stretch>
+        </p:blipFill>
+        <p:spPr>
+          <a:xfrm>
+            <a:off x="7527799" y="2945712"/>
+            <a:ext cx="1991068" cy="1064759"/>
+          </a:xfrm>
+          <a:prstGeom prst="rect">
+            <a:avLst/>
+          </a:prstGeom>
+        </p:spPr>
+      </p:pic>
+      <p:pic>
+        <p:nvPicPr>
+          <p:cNvPr id="16" name="Picture 15">
+            <a:extLst>
+              <a:ext uri="{FF2B5EF4-FFF2-40B4-BE49-F238E27FC236}">
+                <a16:creationId xmlns:a16="http://schemas.microsoft.com/office/drawing/2014/main" id="{FA95477F-1F4B-1889-6490-6A6CFFE60DCF}"/>
+              </a:ext>
+            </a:extLst>
+          </p:cNvPr>
+          <p:cNvPicPr>
+            <a:picLocks noChangeAspect="1"/>
+          </p:cNvPicPr>
+          <p:nvPr/>
+        </p:nvPicPr>
+        <p:blipFill>
+          <a:blip r:embed="rId5"/>
+          <a:stretch>
+            <a:fillRect/>
+          </a:stretch>
+        </p:blipFill>
+        <p:spPr>
+          <a:xfrm>
+            <a:off x="6577866" y="2959030"/>
+            <a:ext cx="719766" cy="519062"/>
+          </a:xfrm>
+          <a:prstGeom prst="rect">
+            <a:avLst/>
+          </a:prstGeom>
+        </p:spPr>
+      </p:pic>
+      <p:pic>
+        <p:nvPicPr>
+          <p:cNvPr id="20" name="Picture 19">
+            <a:extLst>
+              <a:ext uri="{FF2B5EF4-FFF2-40B4-BE49-F238E27FC236}">
+                <a16:creationId xmlns:a16="http://schemas.microsoft.com/office/drawing/2014/main" id="{DB297618-7FAE-6865-DB0C-2D53705ECEEA}"/>
+              </a:ext>
+            </a:extLst>
+          </p:cNvPr>
+          <p:cNvPicPr>
+            <a:picLocks noChangeAspect="1"/>
+          </p:cNvPicPr>
+          <p:nvPr/>
+        </p:nvPicPr>
+        <p:blipFill>
+          <a:blip r:embed="rId6"/>
+          <a:stretch>
+            <a:fillRect/>
+          </a:stretch>
+        </p:blipFill>
+        <p:spPr>
+          <a:xfrm>
+            <a:off x="7527799" y="4528392"/>
+            <a:ext cx="1853545" cy="1210940"/>
+          </a:xfrm>
+          <a:prstGeom prst="rect">
+            <a:avLst/>
+          </a:prstGeom>
+        </p:spPr>
+      </p:pic>
+      <p:pic>
+        <p:nvPicPr>
+          <p:cNvPr id="22" name="Picture 21">
+            <a:extLst>
+              <a:ext uri="{FF2B5EF4-FFF2-40B4-BE49-F238E27FC236}">
+                <a16:creationId xmlns:a16="http://schemas.microsoft.com/office/drawing/2014/main" id="{AA2ABF53-2BDC-A6F0-6E39-2FBF471FC821}"/>
+              </a:ext>
+            </a:extLst>
+          </p:cNvPr>
+          <p:cNvPicPr>
+            <a:picLocks noChangeAspect="1"/>
+          </p:cNvPicPr>
+          <p:nvPr/>
+        </p:nvPicPr>
+        <p:blipFill>
+          <a:blip r:embed="rId7"/>
+          <a:stretch>
+            <a:fillRect/>
+          </a:stretch>
+        </p:blipFill>
+        <p:spPr>
+          <a:xfrm>
+            <a:off x="6620382" y="4529011"/>
+            <a:ext cx="677252" cy="812702"/>
+          </a:xfrm>
+          <a:prstGeom prst="rect">
+            <a:avLst/>
+          </a:prstGeom>
+        </p:spPr>
+      </p:pic>
+      <p:sp>
+        <p:nvSpPr>
+          <p:cNvPr id="25" name="TextBox 24">
+            <a:extLst>
+              <a:ext uri="{FF2B5EF4-FFF2-40B4-BE49-F238E27FC236}">
+                <a16:creationId xmlns:a16="http://schemas.microsoft.com/office/drawing/2014/main" id="{878B482F-C26F-8772-77BE-0BFCD28DF999}"/>
+              </a:ext>
+            </a:extLst>
+          </p:cNvPr>
+          <p:cNvSpPr txBox="1"/>
+          <p:nvPr/>
+        </p:nvSpPr>
+        <p:spPr>
+          <a:xfrm>
+            <a:off x="6495412" y="1956775"/>
+            <a:ext cx="1304056" cy="584775"/>
+          </a:xfrm>
+          <a:prstGeom prst="rect">
+            <a:avLst/>
+          </a:prstGeom>
+          <a:noFill/>
+        </p:spPr>
+        <p:txBody>
+          <a:bodyPr wrap="square" rtlCol="0">
+            <a:spAutoFit/>
+          </a:bodyPr>
+          <a:lstStyle/>
+          <a:p>
+            <a:r>
+              <a:rPr lang="en-US" sz="1600" b="1" dirty="0" err="1"/>
+              <a:t>BeagleBone</a:t>
+            </a:r>
+            <a:r>
+              <a:rPr lang="en-US" sz="1600" b="1" dirty="0"/>
+              <a:t>-Black</a:t>
+            </a:r>
+            <a:endParaRPr lang="en-SG" sz="1600" b="1" dirty="0"/>
+          </a:p>
+        </p:txBody>
+      </p:sp>
+      <p:sp>
+        <p:nvSpPr>
+          <p:cNvPr id="26" name="TextBox 25">
+            <a:extLst>
+              <a:ext uri="{FF2B5EF4-FFF2-40B4-BE49-F238E27FC236}">
+                <a16:creationId xmlns:a16="http://schemas.microsoft.com/office/drawing/2014/main" id="{984E43DA-510C-0EB4-74CF-EA6C4942B2AB}"/>
+              </a:ext>
+            </a:extLst>
+          </p:cNvPr>
+          <p:cNvSpPr txBox="1"/>
+          <p:nvPr/>
+        </p:nvSpPr>
+        <p:spPr>
+          <a:xfrm>
+            <a:off x="6495410" y="3573488"/>
+            <a:ext cx="1209692" cy="584775"/>
+          </a:xfrm>
+          <a:prstGeom prst="rect">
+            <a:avLst/>
+          </a:prstGeom>
+          <a:noFill/>
+        </p:spPr>
+        <p:txBody>
+          <a:bodyPr wrap="square" rtlCol="0">
+            <a:spAutoFit/>
+          </a:bodyPr>
+          <a:lstStyle/>
+          <a:p>
+            <a:r>
+              <a:rPr lang="en-SG" sz="1600" b="1" dirty="0"/>
+              <a:t>Arduino Uno/Nano</a:t>
+            </a:r>
+          </a:p>
+        </p:txBody>
+      </p:sp>
+      <p:sp>
+        <p:nvSpPr>
+          <p:cNvPr id="27" name="TextBox 26">
+            <a:extLst>
+              <a:ext uri="{FF2B5EF4-FFF2-40B4-BE49-F238E27FC236}">
+                <a16:creationId xmlns:a16="http://schemas.microsoft.com/office/drawing/2014/main" id="{AA70A0B5-6A5A-5326-B8A3-E6A68F49B650}"/>
+              </a:ext>
+            </a:extLst>
+          </p:cNvPr>
+          <p:cNvSpPr txBox="1"/>
+          <p:nvPr/>
+        </p:nvSpPr>
+        <p:spPr>
+          <a:xfrm>
+            <a:off x="6408708" y="5262060"/>
+            <a:ext cx="2008018" cy="338554"/>
+          </a:xfrm>
+          <a:prstGeom prst="rect">
+            <a:avLst/>
+          </a:prstGeom>
+          <a:noFill/>
+        </p:spPr>
+        <p:txBody>
+          <a:bodyPr wrap="square" rtlCol="0">
+            <a:spAutoFit/>
+          </a:bodyPr>
+          <a:lstStyle/>
+          <a:p>
+            <a:r>
+              <a:rPr lang="en-US" sz="1600" b="1" dirty="0"/>
+              <a:t>Raspberry PI</a:t>
+            </a:r>
+            <a:endParaRPr lang="en-SG" sz="1600" b="1" dirty="0"/>
+          </a:p>
+        </p:txBody>
+      </p:sp>
+      <p:pic>
+        <p:nvPicPr>
+          <p:cNvPr id="28" name="Picture 27">
+            <a:extLst>
+              <a:ext uri="{FF2B5EF4-FFF2-40B4-BE49-F238E27FC236}">
+                <a16:creationId xmlns:a16="http://schemas.microsoft.com/office/drawing/2014/main" id="{F6D80CA7-9DC0-38A2-873D-A84D0B9AEB49}"/>
+              </a:ext>
+            </a:extLst>
+          </p:cNvPr>
+          <p:cNvPicPr>
+            <a:picLocks noChangeAspect="1"/>
+          </p:cNvPicPr>
+          <p:nvPr/>
+        </p:nvPicPr>
+        <p:blipFill>
+          <a:blip r:embed="rId8"/>
+          <a:stretch>
+            <a:fillRect/>
+          </a:stretch>
+        </p:blipFill>
+        <p:spPr>
+          <a:xfrm>
+            <a:off x="2882952" y="2498078"/>
+            <a:ext cx="2008018" cy="2072603"/>
+          </a:xfrm>
+          <a:prstGeom prst="rect">
+            <a:avLst/>
+          </a:prstGeom>
+        </p:spPr>
+      </p:pic>
+      <p:sp>
+        <p:nvSpPr>
+          <p:cNvPr id="29" name="TextBox 28">
+            <a:extLst>
+              <a:ext uri="{FF2B5EF4-FFF2-40B4-BE49-F238E27FC236}">
+                <a16:creationId xmlns:a16="http://schemas.microsoft.com/office/drawing/2014/main" id="{BE5856DA-F7D9-11B7-CA6B-B21D42D248EE}"/>
+              </a:ext>
+            </a:extLst>
+          </p:cNvPr>
+          <p:cNvSpPr txBox="1"/>
+          <p:nvPr/>
+        </p:nvSpPr>
+        <p:spPr>
+          <a:xfrm>
+            <a:off x="2882952" y="2134376"/>
+            <a:ext cx="2008018" cy="338554"/>
+          </a:xfrm>
+          <a:prstGeom prst="rect">
+            <a:avLst/>
+          </a:prstGeom>
+          <a:noFill/>
+        </p:spPr>
+        <p:txBody>
+          <a:bodyPr wrap="square" rtlCol="0">
+            <a:spAutoFit/>
+          </a:bodyPr>
+          <a:lstStyle/>
+          <a:p>
+            <a:r>
+              <a:rPr lang="en-US" sz="1600" b="1" dirty="0"/>
+              <a:t>I2C DS1307 RTC</a:t>
+            </a:r>
+            <a:endParaRPr lang="en-SG" sz="1600" b="1" dirty="0"/>
+          </a:p>
+        </p:txBody>
+      </p:sp>
+      <p:cxnSp>
+        <p:nvCxnSpPr>
+          <p:cNvPr id="31" name="Connector: Elbow 30">
+            <a:extLst>
+              <a:ext uri="{FF2B5EF4-FFF2-40B4-BE49-F238E27FC236}">
+                <a16:creationId xmlns:a16="http://schemas.microsoft.com/office/drawing/2014/main" id="{9F6AAD95-70AB-674D-0A10-7CAD4C40D490}"/>
+              </a:ext>
+            </a:extLst>
+          </p:cNvPr>
+          <p:cNvCxnSpPr>
+            <a:cxnSpLocks/>
+            <a:endCxn id="10" idx="1"/>
+          </p:cNvCxnSpPr>
+          <p:nvPr/>
+        </p:nvCxnSpPr>
+        <p:spPr>
+          <a:xfrm flipV="1">
+            <a:off x="4890970" y="1900765"/>
+            <a:ext cx="1604443" cy="1107611"/>
+          </a:xfrm>
+          <a:prstGeom prst="bentConnector3">
+            <a:avLst/>
+          </a:prstGeom>
+          <a:ln w="38100">
+            <a:tailEnd type="triangle"/>
+          </a:ln>
+        </p:spPr>
+        <p:style>
+          <a:lnRef idx="2">
+            <a:schemeClr val="accent1"/>
+          </a:lnRef>
+          <a:fillRef idx="0">
+            <a:schemeClr val="accent1"/>
+          </a:fillRef>
+          <a:effectRef idx="1">
+            <a:schemeClr val="accent1"/>
+          </a:effectRef>
+          <a:fontRef idx="minor">
+            <a:schemeClr val="tx1"/>
+          </a:fontRef>
+        </p:style>
+      </p:cxnSp>
+      <p:cxnSp>
+        <p:nvCxnSpPr>
+          <p:cNvPr id="33" name="Straight Arrow Connector 32">
+            <a:extLst>
+              <a:ext uri="{FF2B5EF4-FFF2-40B4-BE49-F238E27FC236}">
+                <a16:creationId xmlns:a16="http://schemas.microsoft.com/office/drawing/2014/main" id="{3CB848F5-4DAE-A4F7-4953-3ADCAA849EAE}"/>
+              </a:ext>
+            </a:extLst>
+          </p:cNvPr>
+          <p:cNvCxnSpPr>
+            <a:cxnSpLocks/>
+            <a:stCxn id="28" idx="3"/>
+            <a:endCxn id="23" idx="1"/>
+          </p:cNvCxnSpPr>
+          <p:nvPr/>
+        </p:nvCxnSpPr>
+        <p:spPr>
+          <a:xfrm>
+            <a:off x="4890970" y="3534380"/>
+            <a:ext cx="1604442" cy="0"/>
+          </a:xfrm>
+          <a:prstGeom prst="straightConnector1">
+            <a:avLst/>
+          </a:prstGeom>
+          <a:ln w="38100">
+            <a:tailEnd type="triangle"/>
+          </a:ln>
+        </p:spPr>
+        <p:style>
+          <a:lnRef idx="2">
+            <a:schemeClr val="accent1"/>
+          </a:lnRef>
+          <a:fillRef idx="0">
+            <a:schemeClr val="accent1"/>
+          </a:fillRef>
+          <a:effectRef idx="1">
+            <a:schemeClr val="accent1"/>
+          </a:effectRef>
+          <a:fontRef idx="minor">
+            <a:schemeClr val="tx1"/>
+          </a:fontRef>
+        </p:style>
+      </p:cxnSp>
+      <p:cxnSp>
+        <p:nvCxnSpPr>
+          <p:cNvPr id="35" name="Connector: Elbow 34">
+            <a:extLst>
+              <a:ext uri="{FF2B5EF4-FFF2-40B4-BE49-F238E27FC236}">
+                <a16:creationId xmlns:a16="http://schemas.microsoft.com/office/drawing/2014/main" id="{EF3FAC97-DE0E-E16D-ADA4-53EBB1CADFC1}"/>
+              </a:ext>
+            </a:extLst>
+          </p:cNvPr>
+          <p:cNvCxnSpPr>
+            <a:cxnSpLocks/>
+            <a:endCxn id="24" idx="1"/>
+          </p:cNvCxnSpPr>
+          <p:nvPr/>
+        </p:nvCxnSpPr>
+        <p:spPr>
+          <a:xfrm>
+            <a:off x="4886767" y="4085582"/>
+            <a:ext cx="1608645" cy="1033262"/>
+          </a:xfrm>
+          <a:prstGeom prst="bentConnector3">
+            <a:avLst/>
+          </a:prstGeom>
+          <a:ln w="38100">
+            <a:tailEnd type="triangle"/>
+          </a:ln>
+        </p:spPr>
+        <p:style>
+          <a:lnRef idx="2">
+            <a:schemeClr val="accent1"/>
+          </a:lnRef>
+          <a:fillRef idx="0">
+            <a:schemeClr val="accent1"/>
+          </a:fillRef>
+          <a:effectRef idx="1">
+            <a:schemeClr val="accent1"/>
+          </a:effectRef>
+          <a:fontRef idx="minor">
+            <a:schemeClr val="tx1"/>
+          </a:fontRef>
+        </p:style>
+      </p:cxnSp>
+      <p:cxnSp>
+        <p:nvCxnSpPr>
+          <p:cNvPr id="37" name="Straight Arrow Connector 36">
+            <a:extLst>
+              <a:ext uri="{FF2B5EF4-FFF2-40B4-BE49-F238E27FC236}">
+                <a16:creationId xmlns:a16="http://schemas.microsoft.com/office/drawing/2014/main" id="{D5865091-448A-5147-3DB9-97ACA52F78F3}"/>
+              </a:ext>
+            </a:extLst>
+          </p:cNvPr>
+          <p:cNvCxnSpPr>
+            <a:cxnSpLocks/>
+          </p:cNvCxnSpPr>
+          <p:nvPr/>
+        </p:nvCxnSpPr>
+        <p:spPr>
+          <a:xfrm>
+            <a:off x="3485386" y="4529010"/>
+            <a:ext cx="0" cy="447089"/>
+          </a:xfrm>
+          <a:prstGeom prst="straightConnector1">
+            <a:avLst/>
+          </a:prstGeom>
+          <a:ln w="38100">
+            <a:tailEnd type="triangle"/>
+          </a:ln>
+        </p:spPr>
+        <p:style>
+          <a:lnRef idx="2">
+            <a:schemeClr val="accent1"/>
+          </a:lnRef>
+          <a:fillRef idx="0">
+            <a:schemeClr val="accent1"/>
+          </a:fillRef>
+          <a:effectRef idx="1">
+            <a:schemeClr val="accent1"/>
+          </a:effectRef>
+          <a:fontRef idx="minor">
+            <a:schemeClr val="tx1"/>
+          </a:fontRef>
+        </p:style>
+      </p:cxnSp>
+      <p:pic>
+        <p:nvPicPr>
+          <p:cNvPr id="1026" name="Picture 2" descr="Microcontroller - Free computer icons">
+            <a:extLst>
+              <a:ext uri="{FF2B5EF4-FFF2-40B4-BE49-F238E27FC236}">
+                <a16:creationId xmlns:a16="http://schemas.microsoft.com/office/drawing/2014/main" id="{A039BD6E-F574-6152-1199-A41FFC568809}"/>
+              </a:ext>
+            </a:extLst>
+          </p:cNvPr>
+          <p:cNvPicPr>
+            <a:picLocks noChangeAspect="1" noChangeArrowheads="1"/>
+          </p:cNvPicPr>
+          <p:nvPr/>
+        </p:nvPicPr>
+        <p:blipFill>
+          <a:blip r:embed="rId9">
+            <a:extLst>
+              <a:ext uri="{28A0092B-C50C-407E-A947-70E740481C1C}">
+                <a14:useLocalDpi xmlns:a14="http://schemas.microsoft.com/office/drawing/2010/main" val="0"/>
+              </a:ext>
+            </a:extLst>
+          </a:blip>
+          <a:srcRect/>
+          <a:stretch>
+            <a:fillRect/>
+          </a:stretch>
+        </p:blipFill>
+        <p:spPr bwMode="auto">
+          <a:xfrm>
+            <a:off x="2882952" y="4645809"/>
+            <a:ext cx="1425271" cy="1425271"/>
+          </a:xfrm>
+          <a:prstGeom prst="rect">
+            <a:avLst/>
+          </a:prstGeom>
+          <a:noFill/>
+          <a:extLst>
+            <a:ext uri="{909E8E84-426E-40DD-AFC4-6F175D3DCCD1}">
+              <a14:hiddenFill xmlns:a14="http://schemas.microsoft.com/office/drawing/2010/main">
+                <a:solidFill>
+                  <a:srgbClr val="FFFFFF"/>
+                </a:solidFill>
+              </a14:hiddenFill>
+            </a:ext>
+          </a:extLst>
+        </p:spPr>
+      </p:pic>
+      <p:sp>
+        <p:nvSpPr>
+          <p:cNvPr id="40" name="TextBox 39">
+            <a:extLst>
+              <a:ext uri="{FF2B5EF4-FFF2-40B4-BE49-F238E27FC236}">
+                <a16:creationId xmlns:a16="http://schemas.microsoft.com/office/drawing/2014/main" id="{9088167D-E83E-DCE7-1CE6-7C8C32787225}"/>
+              </a:ext>
+            </a:extLst>
+          </p:cNvPr>
+          <p:cNvSpPr txBox="1"/>
+          <p:nvPr/>
+        </p:nvSpPr>
+        <p:spPr>
+          <a:xfrm>
+            <a:off x="4316605" y="4745088"/>
+            <a:ext cx="1367355" cy="1077218"/>
+          </a:xfrm>
+          <a:prstGeom prst="rect">
+            <a:avLst/>
+          </a:prstGeom>
+          <a:noFill/>
+        </p:spPr>
+        <p:txBody>
+          <a:bodyPr wrap="square" rtlCol="0">
+            <a:spAutoFit/>
+          </a:bodyPr>
+          <a:lstStyle/>
+          <a:p>
+            <a:r>
+              <a:rPr lang="en-SG" sz="1600" b="1" dirty="0"/>
+              <a:t>Other OT device micro controller </a:t>
+            </a:r>
+          </a:p>
+        </p:txBody>
+      </p:sp>
+      <p:sp>
+        <p:nvSpPr>
+          <p:cNvPr id="50" name="TextBox 49">
+            <a:extLst>
+              <a:ext uri="{FF2B5EF4-FFF2-40B4-BE49-F238E27FC236}">
+                <a16:creationId xmlns:a16="http://schemas.microsoft.com/office/drawing/2014/main" id="{C465060E-C503-C0B4-D49F-6CD4EA08F46B}"/>
+              </a:ext>
+            </a:extLst>
+          </p:cNvPr>
+          <p:cNvSpPr txBox="1"/>
+          <p:nvPr/>
+        </p:nvSpPr>
+        <p:spPr>
+          <a:xfrm>
+            <a:off x="2783809" y="1229220"/>
+            <a:ext cx="2478044" cy="830997"/>
+          </a:xfrm>
+          <a:prstGeom prst="rect">
+            <a:avLst/>
+          </a:prstGeom>
+          <a:noFill/>
+          <a:ln w="19050">
+            <a:solidFill>
+              <a:schemeClr val="tx1"/>
+            </a:solidFill>
+            <a:prstDash val="sysDot"/>
+          </a:ln>
+        </p:spPr>
+        <p:txBody>
+          <a:bodyPr wrap="square" rtlCol="0">
+            <a:spAutoFit/>
+          </a:bodyPr>
+          <a:lstStyle/>
+          <a:p>
+            <a:r>
+              <a:rPr lang="en-US" sz="2400" b="1" dirty="0"/>
+              <a:t>Set RTC Unit for OT/IoT Device</a:t>
+            </a:r>
+            <a:endParaRPr lang="en-SG" sz="2400" b="1" dirty="0"/>
+          </a:p>
+        </p:txBody>
+      </p:sp>
+    </p:spTree>
+    <p:extLst>
+      <p:ext uri="{BB962C8B-B14F-4D97-AF65-F5344CB8AC3E}">
+        <p14:creationId xmlns:p14="http://schemas.microsoft.com/office/powerpoint/2010/main" val="4088739364"/>
+      </p:ext>
+    </p:extLst>
+  </p:cSld>
+  <p:clrMapOvr>
+    <a:masterClrMapping/>
+  </p:clrMapOvr>
+</p:sld>
+</file>
+
+<file path=ppt/slides/slide3.xml><?xml version="1.0" encoding="utf-8"?>
 <p:sld xmlns:a="http://schemas.openxmlformats.org/drawingml/2006/main" xmlns:r="http://schemas.openxmlformats.org/officeDocument/2006/relationships" xmlns:p="http://schemas.openxmlformats.org/presentationml/2006/main">
   <p:cSld>
     <p:spTree>
@@ -4555,7 +5388,7 @@
 </p:sld>
 </file>
 
-<file path=ppt/slides/slide3.xml><?xml version="1.0" encoding="utf-8"?>
+<file path=ppt/slides/slide4.xml><?xml version="1.0" encoding="utf-8"?>
 <p:sld xmlns:a="http://schemas.openxmlformats.org/drawingml/2006/main" xmlns:r="http://schemas.openxmlformats.org/officeDocument/2006/relationships" xmlns:p="http://schemas.openxmlformats.org/presentationml/2006/main">
   <p:cSld>
     <p:spTree>
@@ -5367,7 +6200,7 @@
 </p:sld>
 </file>
 
-<file path=ppt/slides/slide4.xml><?xml version="1.0" encoding="utf-8"?>
+<file path=ppt/slides/slide5.xml><?xml version="1.0" encoding="utf-8"?>
 <p:sld xmlns:a="http://schemas.openxmlformats.org/drawingml/2006/main" xmlns:r="http://schemas.openxmlformats.org/officeDocument/2006/relationships" xmlns:p="http://schemas.openxmlformats.org/presentationml/2006/main">
   <p:cSld>
     <p:spTree>

</xml_diff>